<commit_message>
move persistence and publishing components out to separate libraries.
</commit_message>
<xml_diff>
--- a/Simluator Overview.pptx
+++ b/Simluator Overview.pptx
@@ -16367,7 +16367,7 @@
           <a:p>
             <a:r>
               <a:rPr lang="en-US" sz="1200" dirty="0"/>
-              <a:t>CC2</a:t>
+              <a:t>CC3</a:t>
             </a:r>
           </a:p>
         </p:txBody>
@@ -16926,7 +16926,7 @@
         <p:spPr>
           <a:xfrm>
             <a:off x="9557226" y="1466189"/>
-            <a:ext cx="635751" cy="276999"/>
+            <a:ext cx="928139" cy="276999"/>
           </a:xfrm>
           <a:prstGeom prst="rect">
             <a:avLst/>
@@ -16941,8 +16941,13 @@
           <a:p>
             <a:r>
               <a:rPr lang="en-US" sz="1200" dirty="0"/>
-              <a:t>Market</a:t>
+              <a:t>Market </a:t>
             </a:r>
+            <a:r>
+              <a:rPr lang="en-US" sz="1200" dirty="0" err="1"/>
+              <a:t>Env</a:t>
+            </a:r>
+            <a:endParaRPr lang="en-US" sz="1200" dirty="0"/>
           </a:p>
         </p:txBody>
       </p:sp>

</xml_diff>